<commit_message>
after the presentation, with some fixes
</commit_message>
<xml_diff>
--- a/_week3_Bias versus Variance.pptx
+++ b/_week3_Bias versus Variance.pptx
@@ -262,7 +262,7 @@
           <a:p>
             <a:fld id="{EB5BF3AC-D294-41F1-BAB6-E7D8AE2E08CB}" type="datetimeFigureOut">
               <a:rPr lang="en-US" smtClean="0"/>
-              <a:t>2/1/2024</a:t>
+              <a:t>2/7/2024</a:t>
             </a:fld>
             <a:endParaRPr lang="en-US"/>
           </a:p>
@@ -460,7 +460,7 @@
           <a:p>
             <a:fld id="{EB5BF3AC-D294-41F1-BAB6-E7D8AE2E08CB}" type="datetimeFigureOut">
               <a:rPr lang="en-US" smtClean="0"/>
-              <a:t>2/1/2024</a:t>
+              <a:t>2/7/2024</a:t>
             </a:fld>
             <a:endParaRPr lang="en-US"/>
           </a:p>
@@ -668,7 +668,7 @@
           <a:p>
             <a:fld id="{EB5BF3AC-D294-41F1-BAB6-E7D8AE2E08CB}" type="datetimeFigureOut">
               <a:rPr lang="en-US" smtClean="0"/>
-              <a:t>2/1/2024</a:t>
+              <a:t>2/7/2024</a:t>
             </a:fld>
             <a:endParaRPr lang="en-US"/>
           </a:p>
@@ -866,7 +866,7 @@
           <a:p>
             <a:fld id="{EB5BF3AC-D294-41F1-BAB6-E7D8AE2E08CB}" type="datetimeFigureOut">
               <a:rPr lang="en-US" smtClean="0"/>
-              <a:t>2/1/2024</a:t>
+              <a:t>2/7/2024</a:t>
             </a:fld>
             <a:endParaRPr lang="en-US"/>
           </a:p>
@@ -1141,7 +1141,7 @@
           <a:p>
             <a:fld id="{EB5BF3AC-D294-41F1-BAB6-E7D8AE2E08CB}" type="datetimeFigureOut">
               <a:rPr lang="en-US" smtClean="0"/>
-              <a:t>2/1/2024</a:t>
+              <a:t>2/7/2024</a:t>
             </a:fld>
             <a:endParaRPr lang="en-US"/>
           </a:p>
@@ -1406,7 +1406,7 @@
           <a:p>
             <a:fld id="{EB5BF3AC-D294-41F1-BAB6-E7D8AE2E08CB}" type="datetimeFigureOut">
               <a:rPr lang="en-US" smtClean="0"/>
-              <a:t>2/1/2024</a:t>
+              <a:t>2/7/2024</a:t>
             </a:fld>
             <a:endParaRPr lang="en-US"/>
           </a:p>
@@ -1818,7 +1818,7 @@
           <a:p>
             <a:fld id="{EB5BF3AC-D294-41F1-BAB6-E7D8AE2E08CB}" type="datetimeFigureOut">
               <a:rPr lang="en-US" smtClean="0"/>
-              <a:t>2/1/2024</a:t>
+              <a:t>2/7/2024</a:t>
             </a:fld>
             <a:endParaRPr lang="en-US"/>
           </a:p>
@@ -1959,7 +1959,7 @@
           <a:p>
             <a:fld id="{EB5BF3AC-D294-41F1-BAB6-E7D8AE2E08CB}" type="datetimeFigureOut">
               <a:rPr lang="en-US" smtClean="0"/>
-              <a:t>2/1/2024</a:t>
+              <a:t>2/7/2024</a:t>
             </a:fld>
             <a:endParaRPr lang="en-US"/>
           </a:p>
@@ -2072,7 +2072,7 @@
           <a:p>
             <a:fld id="{EB5BF3AC-D294-41F1-BAB6-E7D8AE2E08CB}" type="datetimeFigureOut">
               <a:rPr lang="en-US" smtClean="0"/>
-              <a:t>2/1/2024</a:t>
+              <a:t>2/7/2024</a:t>
             </a:fld>
             <a:endParaRPr lang="en-US"/>
           </a:p>
@@ -2383,7 +2383,7 @@
           <a:p>
             <a:fld id="{EB5BF3AC-D294-41F1-BAB6-E7D8AE2E08CB}" type="datetimeFigureOut">
               <a:rPr lang="en-US" smtClean="0"/>
-              <a:t>2/1/2024</a:t>
+              <a:t>2/7/2024</a:t>
             </a:fld>
             <a:endParaRPr lang="en-US"/>
           </a:p>
@@ -2671,7 +2671,7 @@
           <a:p>
             <a:fld id="{EB5BF3AC-D294-41F1-BAB6-E7D8AE2E08CB}" type="datetimeFigureOut">
               <a:rPr lang="en-US" smtClean="0"/>
-              <a:t>2/1/2024</a:t>
+              <a:t>2/7/2024</a:t>
             </a:fld>
             <a:endParaRPr lang="en-US"/>
           </a:p>
@@ -2912,7 +2912,7 @@
           <a:p>
             <a:fld id="{EB5BF3AC-D294-41F1-BAB6-E7D8AE2E08CB}" type="datetimeFigureOut">
               <a:rPr lang="en-US" smtClean="0"/>
-              <a:t>2/1/2024</a:t>
+              <a:t>2/7/2024</a:t>
             </a:fld>
             <a:endParaRPr lang="en-US"/>
           </a:p>
@@ -39679,10 +39679,10 @@
       </p:sp>
       <p:pic>
         <p:nvPicPr>
-          <p:cNvPr id="5" name="Content Placeholder 4">
+          <p:cNvPr id="7" name="Content Placeholder 6" descr="A diagram of a normal distribution&#10;&#10;Description automatically generated with medium confidence">
             <a:extLst>
               <a:ext uri="{FF2B5EF4-FFF2-40B4-BE49-F238E27FC236}">
-                <a16:creationId xmlns:a16="http://schemas.microsoft.com/office/drawing/2014/main" id="{F6118516-5552-54B3-8136-19AB4ED5A9BE}"/>
+                <a16:creationId xmlns:a16="http://schemas.microsoft.com/office/drawing/2014/main" id="{94BA7CD2-6FC2-6C2F-5E1B-42F6A352F34F}"/>
               </a:ext>
             </a:extLst>
           </p:cNvPr>
@@ -39694,15 +39694,21 @@
           </p:nvPr>
         </p:nvPicPr>
         <p:blipFill>
-          <a:blip r:embed="rId2"/>
+          <a:blip r:embed="rId2">
+            <a:extLst>
+              <a:ext uri="{28A0092B-C50C-407E-A947-70E740481C1C}">
+                <a14:useLocalDpi xmlns:a14="http://schemas.microsoft.com/office/drawing/2010/main" val="0"/>
+              </a:ext>
+            </a:extLst>
+          </a:blip>
           <a:stretch>
             <a:fillRect/>
           </a:stretch>
         </p:blipFill>
         <p:spPr>
           <a:xfrm>
-            <a:off x="1390650" y="1825625"/>
-            <a:ext cx="7987167" cy="4351338"/>
+            <a:off x="2009775" y="1688422"/>
+            <a:ext cx="7561025" cy="4786652"/>
           </a:xfrm>
         </p:spPr>
       </p:pic>

</xml_diff>